<commit_message>
T10_Button view UI 적용
</commit_message>
<xml_diff>
--- a/DsDotNet/src/UnitTest/UnitTest.Engine/ImportPPT/T0_CaseAll.pptx
+++ b/DsDotNet/src/UnitTest/UnitTest.Engine/ImportPPT/T0_CaseAll.pptx
@@ -11707,6 +11707,187 @@
           </a:fontRef>
         </p:style>
       </p:cxnSp>
+      <p:sp>
+        <p:nvSpPr>
+          <p:cNvPr id="7" name="&quot;허용 안 됨&quot; 기호 6">
+            <a:extLst>
+              <a:ext uri="{FF2B5EF4-FFF2-40B4-BE49-F238E27FC236}">
+                <a16:creationId xmlns:a16="http://schemas.microsoft.com/office/drawing/2014/main" id="{959FDA59-B667-A62F-C7FA-196170419D5C}"/>
+              </a:ext>
+            </a:extLst>
+          </p:cNvPr>
+          <p:cNvSpPr/>
+          <p:nvPr/>
+        </p:nvSpPr>
+        <p:spPr>
+          <a:xfrm>
+            <a:off x="10521217" y="-21337"/>
+            <a:ext cx="1772204" cy="1690778"/>
+          </a:xfrm>
+          <a:prstGeom prst="noSmoking">
+            <a:avLst/>
+          </a:prstGeom>
+          <a:ln>
+            <a:solidFill>
+              <a:schemeClr val="tx1"/>
+            </a:solidFill>
+          </a:ln>
+        </p:spPr>
+        <p:style>
+          <a:lnRef idx="2">
+            <a:schemeClr val="accent1">
+              <a:shade val="50000"/>
+            </a:schemeClr>
+          </a:lnRef>
+          <a:fillRef idx="1">
+            <a:schemeClr val="accent1"/>
+          </a:fillRef>
+          <a:effectRef idx="0">
+            <a:schemeClr val="accent1"/>
+          </a:effectRef>
+          <a:fontRef idx="minor">
+            <a:schemeClr val="lt1"/>
+          </a:fontRef>
+        </p:style>
+        <p:txBody>
+          <a:bodyPr rtlCol="0" anchor="ctr"/>
+          <a:lstStyle/>
+          <a:p>
+            <a:pPr algn="ctr"/>
+            <a:r>
+              <a:rPr lang="en-US" altLang="ko-KR" dirty="0" err="1">
+                <a:solidFill>
+                  <a:schemeClr val="tx1"/>
+                </a:solidFill>
+              </a:rPr>
+              <a:t>EMG1</a:t>
+            </a:r>
+            <a:endParaRPr lang="ko-KR" altLang="en-US" dirty="0">
+              <a:solidFill>
+                <a:schemeClr val="tx1"/>
+              </a:solidFill>
+            </a:endParaRPr>
+          </a:p>
+        </p:txBody>
+      </p:sp>
+      <p:sp>
+        <p:nvSpPr>
+          <p:cNvPr id="9" name="사각형: 빗면 8">
+            <a:extLst>
+              <a:ext uri="{FF2B5EF4-FFF2-40B4-BE49-F238E27FC236}">
+                <a16:creationId xmlns:a16="http://schemas.microsoft.com/office/drawing/2014/main" id="{62C3971E-3AAA-C57D-1AC9-7E00C1C5254B}"/>
+              </a:ext>
+            </a:extLst>
+          </p:cNvPr>
+          <p:cNvSpPr/>
+          <p:nvPr/>
+        </p:nvSpPr>
+        <p:spPr>
+          <a:xfrm>
+            <a:off x="9064748" y="272471"/>
+            <a:ext cx="1104181" cy="1245933"/>
+          </a:xfrm>
+          <a:prstGeom prst="bevel">
+            <a:avLst/>
+          </a:prstGeom>
+          <a:ln>
+            <a:solidFill>
+              <a:schemeClr val="tx1"/>
+            </a:solidFill>
+          </a:ln>
+        </p:spPr>
+        <p:style>
+          <a:lnRef idx="2">
+            <a:schemeClr val="accent1">
+              <a:shade val="50000"/>
+            </a:schemeClr>
+          </a:lnRef>
+          <a:fillRef idx="1">
+            <a:schemeClr val="accent1"/>
+          </a:fillRef>
+          <a:effectRef idx="0">
+            <a:schemeClr val="accent1"/>
+          </a:effectRef>
+          <a:fontRef idx="minor">
+            <a:schemeClr val="lt1"/>
+          </a:fontRef>
+        </p:style>
+        <p:txBody>
+          <a:bodyPr rtlCol="0" anchor="ctr"/>
+          <a:lstStyle/>
+          <a:p>
+            <a:pPr algn="ctr"/>
+            <a:r>
+              <a:rPr lang="en-US" altLang="ko-KR" dirty="0"/>
+              <a:t>RESET1</a:t>
+            </a:r>
+            <a:endParaRPr lang="ko-KR" altLang="en-US" dirty="0"/>
+          </a:p>
+        </p:txBody>
+      </p:sp>
+      <p:sp>
+        <p:nvSpPr>
+          <p:cNvPr id="10" name="원형: 비어 있음 9">
+            <a:extLst>
+              <a:ext uri="{FF2B5EF4-FFF2-40B4-BE49-F238E27FC236}">
+                <a16:creationId xmlns:a16="http://schemas.microsoft.com/office/drawing/2014/main" id="{36F4E5C3-22D7-FF9C-992A-8CE8727B1D8D}"/>
+              </a:ext>
+            </a:extLst>
+          </p:cNvPr>
+          <p:cNvSpPr/>
+          <p:nvPr/>
+        </p:nvSpPr>
+        <p:spPr>
+          <a:xfrm>
+            <a:off x="7042603" y="-21337"/>
+            <a:ext cx="1673524" cy="1690778"/>
+          </a:xfrm>
+          <a:prstGeom prst="donut">
+            <a:avLst/>
+          </a:prstGeom>
+          <a:ln>
+            <a:solidFill>
+              <a:schemeClr val="tx1"/>
+            </a:solidFill>
+          </a:ln>
+        </p:spPr>
+        <p:style>
+          <a:lnRef idx="2">
+            <a:schemeClr val="accent1">
+              <a:shade val="50000"/>
+            </a:schemeClr>
+          </a:lnRef>
+          <a:fillRef idx="1">
+            <a:schemeClr val="accent1"/>
+          </a:fillRef>
+          <a:effectRef idx="0">
+            <a:schemeClr val="accent1"/>
+          </a:effectRef>
+          <a:fontRef idx="minor">
+            <a:schemeClr val="lt1"/>
+          </a:fontRef>
+        </p:style>
+        <p:txBody>
+          <a:bodyPr rtlCol="0" anchor="ctr"/>
+          <a:lstStyle/>
+          <a:p>
+            <a:pPr algn="ctr"/>
+            <a:r>
+              <a:rPr lang="en-US" altLang="ko-KR" dirty="0" err="1">
+                <a:solidFill>
+                  <a:schemeClr val="tx1"/>
+                </a:solidFill>
+              </a:rPr>
+              <a:t>AUTO1</a:t>
+            </a:r>
+            <a:endParaRPr lang="ko-KR" altLang="en-US" dirty="0">
+              <a:solidFill>
+                <a:schemeClr val="tx1"/>
+              </a:solidFill>
+            </a:endParaRPr>
+          </a:p>
+        </p:txBody>
+      </p:sp>
     </p:spTree>
     <p:extLst>
       <p:ext uri="{BB962C8B-B14F-4D97-AF65-F5344CB8AC3E}">

</xml_diff>